<commit_message>
make a new data filter
</commit_message>
<xml_diff>
--- a/text/fig1_raw_dataSummary-DVW.pptx
+++ b/text/fig1_raw_dataSummary-DVW.pptx
@@ -193,7 +193,7 @@
           <a:p>
             <a:fld id="{320668CB-74AE-4B47-945B-A0BE2C83E42B}" type="datetimeFigureOut">
               <a:rPr lang="en-US" smtClean="0"/>
-              <a:t>11/17/15</a:t>
+              <a:t>1/29/16</a:t>
             </a:fld>
             <a:endParaRPr lang="en-US"/>
           </a:p>
@@ -810,7 +810,7 @@
           <a:p>
             <a:fld id="{069CE07A-E8E9-1146-9FA3-86882A69F1AA}" type="datetimeFigureOut">
               <a:rPr lang="en-US" smtClean="0"/>
-              <a:t>11/17/15</a:t>
+              <a:t>1/29/16</a:t>
             </a:fld>
             <a:endParaRPr lang="en-US"/>
           </a:p>
@@ -980,7 +980,7 @@
           <a:p>
             <a:fld id="{069CE07A-E8E9-1146-9FA3-86882A69F1AA}" type="datetimeFigureOut">
               <a:rPr lang="en-US" smtClean="0"/>
-              <a:t>11/17/15</a:t>
+              <a:t>1/29/16</a:t>
             </a:fld>
             <a:endParaRPr lang="en-US"/>
           </a:p>
@@ -1160,7 +1160,7 @@
           <a:p>
             <a:fld id="{069CE07A-E8E9-1146-9FA3-86882A69F1AA}" type="datetimeFigureOut">
               <a:rPr lang="en-US" smtClean="0"/>
-              <a:t>11/17/15</a:t>
+              <a:t>1/29/16</a:t>
             </a:fld>
             <a:endParaRPr lang="en-US"/>
           </a:p>
@@ -1330,7 +1330,7 @@
           <a:p>
             <a:fld id="{069CE07A-E8E9-1146-9FA3-86882A69F1AA}" type="datetimeFigureOut">
               <a:rPr lang="en-US" smtClean="0"/>
-              <a:t>11/17/15</a:t>
+              <a:t>1/29/16</a:t>
             </a:fld>
             <a:endParaRPr lang="en-US"/>
           </a:p>
@@ -1576,7 +1576,7 @@
           <a:p>
             <a:fld id="{069CE07A-E8E9-1146-9FA3-86882A69F1AA}" type="datetimeFigureOut">
               <a:rPr lang="en-US" smtClean="0"/>
-              <a:t>11/17/15</a:t>
+              <a:t>1/29/16</a:t>
             </a:fld>
             <a:endParaRPr lang="en-US"/>
           </a:p>
@@ -1864,7 +1864,7 @@
           <a:p>
             <a:fld id="{069CE07A-E8E9-1146-9FA3-86882A69F1AA}" type="datetimeFigureOut">
               <a:rPr lang="en-US" smtClean="0"/>
-              <a:t>11/17/15</a:t>
+              <a:t>1/29/16</a:t>
             </a:fld>
             <a:endParaRPr lang="en-US"/>
           </a:p>
@@ -2291,7 +2291,7 @@
           <a:p>
             <a:fld id="{069CE07A-E8E9-1146-9FA3-86882A69F1AA}" type="datetimeFigureOut">
               <a:rPr lang="en-US" smtClean="0"/>
-              <a:t>11/17/15</a:t>
+              <a:t>1/29/16</a:t>
             </a:fld>
             <a:endParaRPr lang="en-US"/>
           </a:p>
@@ -2409,7 +2409,7 @@
           <a:p>
             <a:fld id="{069CE07A-E8E9-1146-9FA3-86882A69F1AA}" type="datetimeFigureOut">
               <a:rPr lang="en-US" smtClean="0"/>
-              <a:t>11/17/15</a:t>
+              <a:t>1/29/16</a:t>
             </a:fld>
             <a:endParaRPr lang="en-US"/>
           </a:p>
@@ -2504,7 +2504,7 @@
           <a:p>
             <a:fld id="{069CE07A-E8E9-1146-9FA3-86882A69F1AA}" type="datetimeFigureOut">
               <a:rPr lang="en-US" smtClean="0"/>
-              <a:t>11/17/15</a:t>
+              <a:t>1/29/16</a:t>
             </a:fld>
             <a:endParaRPr lang="en-US"/>
           </a:p>
@@ -2781,7 +2781,7 @@
           <a:p>
             <a:fld id="{069CE07A-E8E9-1146-9FA3-86882A69F1AA}" type="datetimeFigureOut">
               <a:rPr lang="en-US" smtClean="0"/>
-              <a:t>11/17/15</a:t>
+              <a:t>1/29/16</a:t>
             </a:fld>
             <a:endParaRPr lang="en-US"/>
           </a:p>
@@ -3034,7 +3034,7 @@
           <a:p>
             <a:fld id="{069CE07A-E8E9-1146-9FA3-86882A69F1AA}" type="datetimeFigureOut">
               <a:rPr lang="en-US" smtClean="0"/>
-              <a:t>11/17/15</a:t>
+              <a:t>1/29/16</a:t>
             </a:fld>
             <a:endParaRPr lang="en-US"/>
           </a:p>
@@ -3247,7 +3247,7 @@
           <a:p>
             <a:fld id="{069CE07A-E8E9-1146-9FA3-86882A69F1AA}" type="datetimeFigureOut">
               <a:rPr lang="en-US" smtClean="0"/>
-              <a:t>11/17/15</a:t>
+              <a:t>1/29/16</a:t>
             </a:fld>
             <a:endParaRPr lang="en-US"/>
           </a:p>
@@ -13432,12 +13432,8 @@
               <a:buChar char="•"/>
             </a:pPr>
             <a:r>
-              <a:rPr lang="en-US" sz="1200" smtClean="0"/>
-              <a:t>10 </a:t>
-            </a:r>
-            <a:r>
               <a:rPr lang="en-US" sz="1200" dirty="0" smtClean="0"/>
-              <a:t>Different Mg Levels</a:t>
+              <a:t>10 Different Mg Levels</a:t>
             </a:r>
             <a:endParaRPr lang="en-US" sz="1200" dirty="0"/>
           </a:p>
@@ -17156,27 +17152,7 @@
           <a:p>
             <a:r>
               <a:rPr lang="en-US" sz="1000" dirty="0" smtClean="0"/>
-              <a:t>   </a:t>
-            </a:r>
-            <a:r>
-              <a:rPr lang="en-US" sz="1000" dirty="0" smtClean="0"/>
-              <a:t>      </a:t>
-            </a:r>
-            <a:r>
-              <a:rPr lang="en-US" sz="1000" dirty="0" smtClean="0"/>
-              <a:t>= 1     </a:t>
-            </a:r>
-            <a:r>
-              <a:rPr lang="en-US" sz="1000" dirty="0" smtClean="0"/>
-              <a:t>    </a:t>
-            </a:r>
-            <a:r>
-              <a:rPr lang="en-US" sz="1000" dirty="0" smtClean="0"/>
-              <a:t>= 2       </a:t>
-            </a:r>
-            <a:r>
-              <a:rPr lang="en-US" sz="1000" dirty="0" smtClean="0"/>
-              <a:t> = 3   (RNA-</a:t>
+              <a:t>         = 1         = 2        = 3   (RNA-</a:t>
             </a:r>
             <a:r>
               <a:rPr lang="en-US" sz="1000" dirty="0" err="1" smtClean="0"/>
@@ -17527,36 +17503,6 @@
           </a:p>
         </p:txBody>
       </p:sp>
-      <p:pic>
-        <p:nvPicPr>
-          <p:cNvPr id="10" name="Picture 9" descr="testTubeA.png"/>
-          <p:cNvPicPr>
-            <a:picLocks noChangeAspect="1"/>
-          </p:cNvPicPr>
-          <p:nvPr/>
-        </p:nvPicPr>
-        <p:blipFill>
-          <a:blip r:embed="rId3">
-            <a:extLst>
-              <a:ext uri="{28A0092B-C50C-407E-A947-70E740481C1C}">
-                <a14:useLocalDpi xmlns:a14="http://schemas.microsoft.com/office/drawing/2010/main" val="0"/>
-              </a:ext>
-            </a:extLst>
-          </a:blip>
-          <a:stretch>
-            <a:fillRect/>
-          </a:stretch>
-        </p:blipFill>
-        <p:spPr>
-          <a:xfrm>
-            <a:off x="2276746" y="1049089"/>
-            <a:ext cx="203260" cy="189664"/>
-          </a:xfrm>
-          <a:prstGeom prst="rect">
-            <a:avLst/>
-          </a:prstGeom>
-        </p:spPr>
-      </p:pic>
       <p:cxnSp>
         <p:nvCxnSpPr>
           <p:cNvPr id="14" name="Straight Arrow Connector 13"/>
@@ -17948,36 +17894,6 @@
           </a:fontRef>
         </p:style>
       </p:cxnSp>
-      <p:pic>
-        <p:nvPicPr>
-          <p:cNvPr id="28" name="Picture 27" descr="testTubeB.png"/>
-          <p:cNvPicPr>
-            <a:picLocks noChangeAspect="1"/>
-          </p:cNvPicPr>
-          <p:nvPr/>
-        </p:nvPicPr>
-        <p:blipFill>
-          <a:blip r:embed="rId4">
-            <a:extLst>
-              <a:ext uri="{28A0092B-C50C-407E-A947-70E740481C1C}">
-                <a14:useLocalDpi xmlns:a14="http://schemas.microsoft.com/office/drawing/2010/main" val="0"/>
-              </a:ext>
-            </a:extLst>
-          </a:blip>
-          <a:stretch>
-            <a:fillRect/>
-          </a:stretch>
-        </p:blipFill>
-        <p:spPr>
-          <a:xfrm>
-            <a:off x="2291391" y="2004121"/>
-            <a:ext cx="187363" cy="174830"/>
-          </a:xfrm>
-          <a:prstGeom prst="rect">
-            <a:avLst/>
-          </a:prstGeom>
-        </p:spPr>
-      </p:pic>
       <p:cxnSp>
         <p:nvCxnSpPr>
           <p:cNvPr id="31" name="Straight Arrow Connector 30"/>
@@ -18016,36 +17932,6 @@
           </a:fontRef>
         </p:style>
       </p:cxnSp>
-      <p:pic>
-        <p:nvPicPr>
-          <p:cNvPr id="34" name="Picture 33" descr="testTubeC.png"/>
-          <p:cNvPicPr>
-            <a:picLocks noChangeAspect="1"/>
-          </p:cNvPicPr>
-          <p:nvPr/>
-        </p:nvPicPr>
-        <p:blipFill>
-          <a:blip r:embed="rId5">
-            <a:extLst>
-              <a:ext uri="{28A0092B-C50C-407E-A947-70E740481C1C}">
-                <a14:useLocalDpi xmlns:a14="http://schemas.microsoft.com/office/drawing/2010/main" val="0"/>
-              </a:ext>
-            </a:extLst>
-          </a:blip>
-          <a:stretch>
-            <a:fillRect/>
-          </a:stretch>
-        </p:blipFill>
-        <p:spPr>
-          <a:xfrm>
-            <a:off x="2288957" y="3027478"/>
-            <a:ext cx="189797" cy="177101"/>
-          </a:xfrm>
-          <a:prstGeom prst="rect">
-            <a:avLst/>
-          </a:prstGeom>
-        </p:spPr>
-      </p:pic>
       <p:cxnSp>
         <p:nvCxnSpPr>
           <p:cNvPr id="37" name="Straight Arrow Connector 36"/>
@@ -18084,36 +17970,6 @@
           </a:fontRef>
         </p:style>
       </p:cxnSp>
-      <p:pic>
-        <p:nvPicPr>
-          <p:cNvPr id="40" name="Picture 39" descr="testTubeD.png"/>
-          <p:cNvPicPr>
-            <a:picLocks noChangeAspect="1"/>
-          </p:cNvPicPr>
-          <p:nvPr/>
-        </p:nvPicPr>
-        <p:blipFill>
-          <a:blip r:embed="rId6">
-            <a:extLst>
-              <a:ext uri="{28A0092B-C50C-407E-A947-70E740481C1C}">
-                <a14:useLocalDpi xmlns:a14="http://schemas.microsoft.com/office/drawing/2010/main" val="0"/>
-              </a:ext>
-            </a:extLst>
-          </a:blip>
-          <a:stretch>
-            <a:fillRect/>
-          </a:stretch>
-        </p:blipFill>
-        <p:spPr>
-          <a:xfrm>
-            <a:off x="2292643" y="4069541"/>
-            <a:ext cx="186111" cy="173662"/>
-          </a:xfrm>
-          <a:prstGeom prst="rect">
-            <a:avLst/>
-          </a:prstGeom>
-        </p:spPr>
-      </p:pic>
       <p:cxnSp>
         <p:nvCxnSpPr>
           <p:cNvPr id="43" name="Straight Arrow Connector 42"/>
@@ -18200,7 +18056,7 @@
           <p:nvPr>
             <p:extLst>
               <p:ext uri="{D42A27DB-BD31-4B8C-83A1-F6EECF244321}">
-                <p14:modId xmlns:p14="http://schemas.microsoft.com/office/powerpoint/2010/main" val="2321403729"/>
+                <p14:modId xmlns:p14="http://schemas.microsoft.com/office/powerpoint/2010/main" val="3117629589"/>
               </p:ext>
             </p:extLst>
           </p:nvPr>
@@ -18249,6 +18105,12 @@
                     <a:lnB>
                       <a:noFill/>
                     </a:lnB>
+                    <a:solidFill>
+                      <a:schemeClr val="accent4">
+                        <a:lumMod val="20000"/>
+                        <a:lumOff val="80000"/>
+                      </a:schemeClr>
+                    </a:solidFill>
                   </a:tcPr>
                 </a:tc>
                 <a:tc>
@@ -18324,6 +18186,12 @@
                     <a:lnB>
                       <a:noFill/>
                     </a:lnB>
+                    <a:solidFill>
+                      <a:schemeClr val="accent4">
+                        <a:lumMod val="40000"/>
+                        <a:lumOff val="60000"/>
+                      </a:schemeClr>
+                    </a:solidFill>
                   </a:tcPr>
                 </a:tc>
                 <a:tc>
@@ -18415,6 +18283,12 @@
                     <a:lnB>
                       <a:noFill/>
                     </a:lnB>
+                    <a:solidFill>
+                      <a:schemeClr val="accent4">
+                        <a:lumMod val="60000"/>
+                        <a:lumOff val="40000"/>
+                      </a:schemeClr>
+                    </a:solidFill>
                   </a:tcPr>
                 </a:tc>
                 <a:tc>
@@ -18509,6 +18383,11 @@
                     <a:lnB>
                       <a:noFill/>
                     </a:lnB>
+                    <a:solidFill>
+                      <a:schemeClr val="accent4">
+                        <a:lumMod val="75000"/>
+                      </a:schemeClr>
+                    </a:solidFill>
                   </a:tcPr>
                 </a:tc>
                 <a:tc>
@@ -18593,6 +18472,12 @@
                     <a:lnB>
                       <a:noFill/>
                     </a:lnB>
+                    <a:solidFill>
+                      <a:schemeClr val="accent4">
+                        <a:lumMod val="20000"/>
+                        <a:lumOff val="80000"/>
+                      </a:schemeClr>
+                    </a:solidFill>
                   </a:tcPr>
                 </a:tc>
                 <a:tc>
@@ -18668,6 +18553,12 @@
                     <a:lnB>
                       <a:noFill/>
                     </a:lnB>
+                    <a:solidFill>
+                      <a:schemeClr val="accent4">
+                        <a:lumMod val="20000"/>
+                        <a:lumOff val="80000"/>
+                      </a:schemeClr>
+                    </a:solidFill>
                   </a:tcPr>
                 </a:tc>
                 <a:tc>
@@ -18750,6 +18641,12 @@
                     <a:lnB>
                       <a:noFill/>
                     </a:lnB>
+                    <a:solidFill>
+                      <a:schemeClr val="accent4">
+                        <a:lumMod val="20000"/>
+                        <a:lumOff val="80000"/>
+                      </a:schemeClr>
+                    </a:solidFill>
                   </a:tcPr>
                 </a:tc>
                 <a:tc>
@@ -27030,11 +26927,7 @@
             </a:pPr>
             <a:r>
               <a:rPr lang="en-US" sz="1100" dirty="0" smtClean="0"/>
-              <a:t>143 Data </a:t>
-            </a:r>
-            <a:r>
-              <a:rPr lang="en-US" sz="1100" dirty="0" smtClean="0"/>
-              <a:t>Points (RNA-</a:t>
+              <a:t>143 Data Points (RNA-</a:t>
             </a:r>
             <a:r>
               <a:rPr lang="en-US" sz="1100" dirty="0" err="1" smtClean="0"/>
@@ -27054,7 +26947,6 @@
               <a:rPr lang="en-US" sz="1100" dirty="0" smtClean="0"/>
               <a:t>81 Data Points (Proteins)</a:t>
             </a:r>
-            <a:endParaRPr lang="en-US" sz="1100" dirty="0" smtClean="0"/>
           </a:p>
           <a:p>
             <a:pPr marL="171450" indent="-171450">
@@ -29000,486 +28892,6 @@
           </p:txBody>
         </p:sp>
       </p:grpSp>
-      <p:pic>
-        <p:nvPicPr>
-          <p:cNvPr id="142" name="Picture 141" descr="testTubeA.png"/>
-          <p:cNvPicPr>
-            <a:picLocks noChangeAspect="1"/>
-          </p:cNvPicPr>
-          <p:nvPr/>
-        </p:nvPicPr>
-        <p:blipFill>
-          <a:blip r:embed="rId3">
-            <a:extLst>
-              <a:ext uri="{28A0092B-C50C-407E-A947-70E740481C1C}">
-                <a14:useLocalDpi xmlns:a14="http://schemas.microsoft.com/office/drawing/2010/main" val="0"/>
-              </a:ext>
-            </a:extLst>
-          </a:blip>
-          <a:stretch>
-            <a:fillRect/>
-          </a:stretch>
-        </p:blipFill>
-        <p:spPr>
-          <a:xfrm>
-            <a:off x="2275494" y="1223702"/>
-            <a:ext cx="203260" cy="189664"/>
-          </a:xfrm>
-          <a:prstGeom prst="rect">
-            <a:avLst/>
-          </a:prstGeom>
-        </p:spPr>
-      </p:pic>
-      <p:pic>
-        <p:nvPicPr>
-          <p:cNvPr id="143" name="Picture 142" descr="testTubeA.png"/>
-          <p:cNvPicPr>
-            <a:picLocks noChangeAspect="1"/>
-          </p:cNvPicPr>
-          <p:nvPr/>
-        </p:nvPicPr>
-        <p:blipFill>
-          <a:blip r:embed="rId3">
-            <a:extLst>
-              <a:ext uri="{28A0092B-C50C-407E-A947-70E740481C1C}">
-                <a14:useLocalDpi xmlns:a14="http://schemas.microsoft.com/office/drawing/2010/main" val="0"/>
-              </a:ext>
-            </a:extLst>
-          </a:blip>
-          <a:stretch>
-            <a:fillRect/>
-          </a:stretch>
-        </p:blipFill>
-        <p:spPr>
-          <a:xfrm>
-            <a:off x="2276746" y="1413366"/>
-            <a:ext cx="203260" cy="189664"/>
-          </a:xfrm>
-          <a:prstGeom prst="rect">
-            <a:avLst/>
-          </a:prstGeom>
-        </p:spPr>
-      </p:pic>
-      <p:pic>
-        <p:nvPicPr>
-          <p:cNvPr id="144" name="Picture 143" descr="testTubeB.png"/>
-          <p:cNvPicPr>
-            <a:picLocks noChangeAspect="1"/>
-          </p:cNvPicPr>
-          <p:nvPr/>
-        </p:nvPicPr>
-        <p:blipFill>
-          <a:blip r:embed="rId4">
-            <a:extLst>
-              <a:ext uri="{28A0092B-C50C-407E-A947-70E740481C1C}">
-                <a14:useLocalDpi xmlns:a14="http://schemas.microsoft.com/office/drawing/2010/main" val="0"/>
-              </a:ext>
-            </a:extLst>
-          </a:blip>
-          <a:stretch>
-            <a:fillRect/>
-          </a:stretch>
-        </p:blipFill>
-        <p:spPr>
-          <a:xfrm>
-            <a:off x="2292643" y="2178951"/>
-            <a:ext cx="187363" cy="174830"/>
-          </a:xfrm>
-          <a:prstGeom prst="rect">
-            <a:avLst/>
-          </a:prstGeom>
-        </p:spPr>
-      </p:pic>
-      <p:pic>
-        <p:nvPicPr>
-          <p:cNvPr id="145" name="Picture 144" descr="testTubeB.png"/>
-          <p:cNvPicPr>
-            <a:picLocks noChangeAspect="1"/>
-          </p:cNvPicPr>
-          <p:nvPr/>
-        </p:nvPicPr>
-        <p:blipFill>
-          <a:blip r:embed="rId4">
-            <a:extLst>
-              <a:ext uri="{28A0092B-C50C-407E-A947-70E740481C1C}">
-                <a14:useLocalDpi xmlns:a14="http://schemas.microsoft.com/office/drawing/2010/main" val="0"/>
-              </a:ext>
-            </a:extLst>
-          </a:blip>
-          <a:stretch>
-            <a:fillRect/>
-          </a:stretch>
-        </p:blipFill>
-        <p:spPr>
-          <a:xfrm>
-            <a:off x="2291391" y="2353781"/>
-            <a:ext cx="187363" cy="174830"/>
-          </a:xfrm>
-          <a:prstGeom prst="rect">
-            <a:avLst/>
-          </a:prstGeom>
-        </p:spPr>
-      </p:pic>
-      <p:pic>
-        <p:nvPicPr>
-          <p:cNvPr id="146" name="Picture 145" descr="testTubeC.png"/>
-          <p:cNvPicPr>
-            <a:picLocks noChangeAspect="1"/>
-          </p:cNvPicPr>
-          <p:nvPr/>
-        </p:nvPicPr>
-        <p:blipFill>
-          <a:blip r:embed="rId5">
-            <a:extLst>
-              <a:ext uri="{28A0092B-C50C-407E-A947-70E740481C1C}">
-                <a14:useLocalDpi xmlns:a14="http://schemas.microsoft.com/office/drawing/2010/main" val="0"/>
-              </a:ext>
-            </a:extLst>
-          </a:blip>
-          <a:stretch>
-            <a:fillRect/>
-          </a:stretch>
-        </p:blipFill>
-        <p:spPr>
-          <a:xfrm>
-            <a:off x="2288957" y="3211562"/>
-            <a:ext cx="189797" cy="177101"/>
-          </a:xfrm>
-          <a:prstGeom prst="rect">
-            <a:avLst/>
-          </a:prstGeom>
-        </p:spPr>
-      </p:pic>
-      <p:pic>
-        <p:nvPicPr>
-          <p:cNvPr id="147" name="Picture 146" descr="testTubeC.png"/>
-          <p:cNvPicPr>
-            <a:picLocks noChangeAspect="1"/>
-          </p:cNvPicPr>
-          <p:nvPr/>
-        </p:nvPicPr>
-        <p:blipFill>
-          <a:blip r:embed="rId5">
-            <a:extLst>
-              <a:ext uri="{28A0092B-C50C-407E-A947-70E740481C1C}">
-                <a14:useLocalDpi xmlns:a14="http://schemas.microsoft.com/office/drawing/2010/main" val="0"/>
-              </a:ext>
-            </a:extLst>
-          </a:blip>
-          <a:stretch>
-            <a:fillRect/>
-          </a:stretch>
-        </p:blipFill>
-        <p:spPr>
-          <a:xfrm>
-            <a:off x="2288957" y="3388663"/>
-            <a:ext cx="189797" cy="177101"/>
-          </a:xfrm>
-          <a:prstGeom prst="rect">
-            <a:avLst/>
-          </a:prstGeom>
-        </p:spPr>
-      </p:pic>
-      <p:pic>
-        <p:nvPicPr>
-          <p:cNvPr id="149" name="Picture 148" descr="testTubeD.png"/>
-          <p:cNvPicPr>
-            <a:picLocks noChangeAspect="1"/>
-          </p:cNvPicPr>
-          <p:nvPr/>
-        </p:nvPicPr>
-        <p:blipFill>
-          <a:blip r:embed="rId6">
-            <a:extLst>
-              <a:ext uri="{28A0092B-C50C-407E-A947-70E740481C1C}">
-                <a14:useLocalDpi xmlns:a14="http://schemas.microsoft.com/office/drawing/2010/main" val="0"/>
-              </a:ext>
-            </a:extLst>
-          </a:blip>
-          <a:stretch>
-            <a:fillRect/>
-          </a:stretch>
-        </p:blipFill>
-        <p:spPr>
-          <a:xfrm>
-            <a:off x="2293895" y="4239154"/>
-            <a:ext cx="186111" cy="173662"/>
-          </a:xfrm>
-          <a:prstGeom prst="rect">
-            <a:avLst/>
-          </a:prstGeom>
-        </p:spPr>
-      </p:pic>
-      <p:pic>
-        <p:nvPicPr>
-          <p:cNvPr id="150" name="Picture 149" descr="testTubeD.png"/>
-          <p:cNvPicPr>
-            <a:picLocks noChangeAspect="1"/>
-          </p:cNvPicPr>
-          <p:nvPr/>
-        </p:nvPicPr>
-        <p:blipFill>
-          <a:blip r:embed="rId6">
-            <a:extLst>
-              <a:ext uri="{28A0092B-C50C-407E-A947-70E740481C1C}">
-                <a14:useLocalDpi xmlns:a14="http://schemas.microsoft.com/office/drawing/2010/main" val="0"/>
-              </a:ext>
-            </a:extLst>
-          </a:blip>
-          <a:stretch>
-            <a:fillRect/>
-          </a:stretch>
-        </p:blipFill>
-        <p:spPr>
-          <a:xfrm>
-            <a:off x="2293895" y="4391554"/>
-            <a:ext cx="186111" cy="173662"/>
-          </a:xfrm>
-          <a:prstGeom prst="rect">
-            <a:avLst/>
-          </a:prstGeom>
-        </p:spPr>
-      </p:pic>
-      <p:pic>
-        <p:nvPicPr>
-          <p:cNvPr id="151" name="Picture 150" descr="testTubeA.png"/>
-          <p:cNvPicPr>
-            <a:picLocks noChangeAspect="1"/>
-          </p:cNvPicPr>
-          <p:nvPr/>
-        </p:nvPicPr>
-        <p:blipFill>
-          <a:blip r:embed="rId3">
-            <a:extLst>
-              <a:ext uri="{28A0092B-C50C-407E-A947-70E740481C1C}">
-                <a14:useLocalDpi xmlns:a14="http://schemas.microsoft.com/office/drawing/2010/main" val="0"/>
-              </a:ext>
-            </a:extLst>
-          </a:blip>
-          <a:stretch>
-            <a:fillRect/>
-          </a:stretch>
-        </p:blipFill>
-        <p:spPr>
-          <a:xfrm>
-            <a:off x="2276746" y="5438097"/>
-            <a:ext cx="203260" cy="189664"/>
-          </a:xfrm>
-          <a:prstGeom prst="rect">
-            <a:avLst/>
-          </a:prstGeom>
-        </p:spPr>
-      </p:pic>
-      <p:pic>
-        <p:nvPicPr>
-          <p:cNvPr id="152" name="Picture 151" descr="testTubeA.png"/>
-          <p:cNvPicPr>
-            <a:picLocks noChangeAspect="1"/>
-          </p:cNvPicPr>
-          <p:nvPr/>
-        </p:nvPicPr>
-        <p:blipFill>
-          <a:blip r:embed="rId3">
-            <a:extLst>
-              <a:ext uri="{28A0092B-C50C-407E-A947-70E740481C1C}">
-                <a14:useLocalDpi xmlns:a14="http://schemas.microsoft.com/office/drawing/2010/main" val="0"/>
-              </a:ext>
-            </a:extLst>
-          </a:blip>
-          <a:stretch>
-            <a:fillRect/>
-          </a:stretch>
-        </p:blipFill>
-        <p:spPr>
-          <a:xfrm>
-            <a:off x="2275494" y="5612710"/>
-            <a:ext cx="203260" cy="189664"/>
-          </a:xfrm>
-          <a:prstGeom prst="rect">
-            <a:avLst/>
-          </a:prstGeom>
-        </p:spPr>
-      </p:pic>
-      <p:pic>
-        <p:nvPicPr>
-          <p:cNvPr id="153" name="Picture 152" descr="testTubeA.png"/>
-          <p:cNvPicPr>
-            <a:picLocks noChangeAspect="1"/>
-          </p:cNvPicPr>
-          <p:nvPr/>
-        </p:nvPicPr>
-        <p:blipFill>
-          <a:blip r:embed="rId3">
-            <a:extLst>
-              <a:ext uri="{28A0092B-C50C-407E-A947-70E740481C1C}">
-                <a14:useLocalDpi xmlns:a14="http://schemas.microsoft.com/office/drawing/2010/main" val="0"/>
-              </a:ext>
-            </a:extLst>
-          </a:blip>
-          <a:stretch>
-            <a:fillRect/>
-          </a:stretch>
-        </p:blipFill>
-        <p:spPr>
-          <a:xfrm>
-            <a:off x="2276746" y="5802374"/>
-            <a:ext cx="203260" cy="189664"/>
-          </a:xfrm>
-          <a:prstGeom prst="rect">
-            <a:avLst/>
-          </a:prstGeom>
-        </p:spPr>
-      </p:pic>
-      <p:pic>
-        <p:nvPicPr>
-          <p:cNvPr id="157" name="Picture 156" descr="testTubeA.png"/>
-          <p:cNvPicPr>
-            <a:picLocks noChangeAspect="1"/>
-          </p:cNvPicPr>
-          <p:nvPr/>
-        </p:nvPicPr>
-        <p:blipFill>
-          <a:blip r:embed="rId3">
-            <a:extLst>
-              <a:ext uri="{28A0092B-C50C-407E-A947-70E740481C1C}">
-                <a14:useLocalDpi xmlns:a14="http://schemas.microsoft.com/office/drawing/2010/main" val="0"/>
-              </a:ext>
-            </a:extLst>
-          </a:blip>
-          <a:stretch>
-            <a:fillRect/>
-          </a:stretch>
-        </p:blipFill>
-        <p:spPr>
-          <a:xfrm>
-            <a:off x="2276746" y="6378599"/>
-            <a:ext cx="203260" cy="189664"/>
-          </a:xfrm>
-          <a:prstGeom prst="rect">
-            <a:avLst/>
-          </a:prstGeom>
-        </p:spPr>
-      </p:pic>
-      <p:pic>
-        <p:nvPicPr>
-          <p:cNvPr id="158" name="Picture 157" descr="testTubeA.png"/>
-          <p:cNvPicPr>
-            <a:picLocks noChangeAspect="1"/>
-          </p:cNvPicPr>
-          <p:nvPr/>
-        </p:nvPicPr>
-        <p:blipFill>
-          <a:blip r:embed="rId3">
-            <a:extLst>
-              <a:ext uri="{28A0092B-C50C-407E-A947-70E740481C1C}">
-                <a14:useLocalDpi xmlns:a14="http://schemas.microsoft.com/office/drawing/2010/main" val="0"/>
-              </a:ext>
-            </a:extLst>
-          </a:blip>
-          <a:stretch>
-            <a:fillRect/>
-          </a:stretch>
-        </p:blipFill>
-        <p:spPr>
-          <a:xfrm>
-            <a:off x="2275494" y="6553212"/>
-            <a:ext cx="203260" cy="189664"/>
-          </a:xfrm>
-          <a:prstGeom prst="rect">
-            <a:avLst/>
-          </a:prstGeom>
-        </p:spPr>
-      </p:pic>
-      <p:pic>
-        <p:nvPicPr>
-          <p:cNvPr id="159" name="Picture 158" descr="testTubeA.png"/>
-          <p:cNvPicPr>
-            <a:picLocks noChangeAspect="1"/>
-          </p:cNvPicPr>
-          <p:nvPr/>
-        </p:nvPicPr>
-        <p:blipFill>
-          <a:blip r:embed="rId3">
-            <a:extLst>
-              <a:ext uri="{28A0092B-C50C-407E-A947-70E740481C1C}">
-                <a14:useLocalDpi xmlns:a14="http://schemas.microsoft.com/office/drawing/2010/main" val="0"/>
-              </a:ext>
-            </a:extLst>
-          </a:blip>
-          <a:stretch>
-            <a:fillRect/>
-          </a:stretch>
-        </p:blipFill>
-        <p:spPr>
-          <a:xfrm>
-            <a:off x="2276746" y="6742876"/>
-            <a:ext cx="203260" cy="189664"/>
-          </a:xfrm>
-          <a:prstGeom prst="rect">
-            <a:avLst/>
-          </a:prstGeom>
-        </p:spPr>
-      </p:pic>
-      <p:pic>
-        <p:nvPicPr>
-          <p:cNvPr id="160" name="Picture 159" descr="testTubeA.png"/>
-          <p:cNvPicPr>
-            <a:picLocks noChangeAspect="1"/>
-          </p:cNvPicPr>
-          <p:nvPr/>
-        </p:nvPicPr>
-        <p:blipFill>
-          <a:blip r:embed="rId3">
-            <a:extLst>
-              <a:ext uri="{28A0092B-C50C-407E-A947-70E740481C1C}">
-                <a14:useLocalDpi xmlns:a14="http://schemas.microsoft.com/office/drawing/2010/main" val="0"/>
-              </a:ext>
-            </a:extLst>
-          </a:blip>
-          <a:stretch>
-            <a:fillRect/>
-          </a:stretch>
-        </p:blipFill>
-        <p:spPr>
-          <a:xfrm>
-            <a:off x="2290209" y="7393434"/>
-            <a:ext cx="203260" cy="189664"/>
-          </a:xfrm>
-          <a:prstGeom prst="rect">
-            <a:avLst/>
-          </a:prstGeom>
-        </p:spPr>
-      </p:pic>
-      <p:pic>
-        <p:nvPicPr>
-          <p:cNvPr id="161" name="Picture 160" descr="testTubeA.png"/>
-          <p:cNvPicPr>
-            <a:picLocks noChangeAspect="1"/>
-          </p:cNvPicPr>
-          <p:nvPr/>
-        </p:nvPicPr>
-        <p:blipFill>
-          <a:blip r:embed="rId3">
-            <a:extLst>
-              <a:ext uri="{28A0092B-C50C-407E-A947-70E740481C1C}">
-                <a14:useLocalDpi xmlns:a14="http://schemas.microsoft.com/office/drawing/2010/main" val="0"/>
-              </a:ext>
-            </a:extLst>
-          </a:blip>
-          <a:stretch>
-            <a:fillRect/>
-          </a:stretch>
-        </p:blipFill>
-        <p:spPr>
-          <a:xfrm>
-            <a:off x="2288957" y="7568047"/>
-            <a:ext cx="203260" cy="189664"/>
-          </a:xfrm>
-          <a:prstGeom prst="rect">
-            <a:avLst/>
-          </a:prstGeom>
-        </p:spPr>
-      </p:pic>
       <p:cxnSp>
         <p:nvCxnSpPr>
           <p:cNvPr id="155" name="Straight Arrow Connector 154"/>
@@ -29518,36 +28930,6 @@
           </a:fontRef>
         </p:style>
       </p:cxnSp>
-      <p:pic>
-        <p:nvPicPr>
-          <p:cNvPr id="162" name="Picture 161" descr="testTubeA.png"/>
-          <p:cNvPicPr>
-            <a:picLocks noChangeAspect="1"/>
-          </p:cNvPicPr>
-          <p:nvPr/>
-        </p:nvPicPr>
-        <p:blipFill>
-          <a:blip r:embed="rId3">
-            <a:extLst>
-              <a:ext uri="{28A0092B-C50C-407E-A947-70E740481C1C}">
-                <a14:useLocalDpi xmlns:a14="http://schemas.microsoft.com/office/drawing/2010/main" val="0"/>
-              </a:ext>
-            </a:extLst>
-          </a:blip>
-          <a:stretch>
-            <a:fillRect/>
-          </a:stretch>
-        </p:blipFill>
-        <p:spPr>
-          <a:xfrm>
-            <a:off x="2290209" y="7757711"/>
-            <a:ext cx="203260" cy="189664"/>
-          </a:xfrm>
-          <a:prstGeom prst="rect">
-            <a:avLst/>
-          </a:prstGeom>
-        </p:spPr>
-      </p:pic>
       <p:sp>
         <p:nvSpPr>
           <p:cNvPr id="2" name="TextBox 1"/>

</xml_diff>